<commit_message>
Préparation de la revue
Mise au propre des différents schémas et ajout du budget comme contrainte dans les CDCF
</commit_message>
<xml_diff>
--- a/Gestion de Projet/Phase 0/Diagrammes phase 0.pptx
+++ b/Gestion de Projet/Phase 0/Diagrammes phase 0.pptx
@@ -21927,7 +21927,7 @@
           <a:p>
             <a:fld id="{A20A18A5-0E0E-4059-9C3A-AEC3E78DECBE}" type="datetimeFigureOut">
               <a:rPr lang="fr-FR" smtClean="0"/>
-              <a:t>02/02/2025</a:t>
+              <a:t>17/02/2025</a:t>
             </a:fld>
             <a:endParaRPr lang="fr-FR"/>
           </a:p>
@@ -22425,7 +22425,7 @@
           <a:p>
             <a:fld id="{DEAE869C-FD18-4CA6-B58E-F785B722D3DA}" type="datetimeFigureOut">
               <a:rPr lang="fr-FR" smtClean="0"/>
-              <a:t>02/02/2025</a:t>
+              <a:t>17/02/2025</a:t>
             </a:fld>
             <a:endParaRPr lang="fr-FR"/>
           </a:p>
@@ -22623,7 +22623,7 @@
           <a:p>
             <a:fld id="{DEAE869C-FD18-4CA6-B58E-F785B722D3DA}" type="datetimeFigureOut">
               <a:rPr lang="fr-FR" smtClean="0"/>
-              <a:t>02/02/2025</a:t>
+              <a:t>17/02/2025</a:t>
             </a:fld>
             <a:endParaRPr lang="fr-FR"/>
           </a:p>
@@ -22831,7 +22831,7 @@
           <a:p>
             <a:fld id="{DEAE869C-FD18-4CA6-B58E-F785B722D3DA}" type="datetimeFigureOut">
               <a:rPr lang="fr-FR" smtClean="0"/>
-              <a:t>02/02/2025</a:t>
+              <a:t>17/02/2025</a:t>
             </a:fld>
             <a:endParaRPr lang="fr-FR"/>
           </a:p>
@@ -23029,7 +23029,7 @@
           <a:p>
             <a:fld id="{DEAE869C-FD18-4CA6-B58E-F785B722D3DA}" type="datetimeFigureOut">
               <a:rPr lang="fr-FR" smtClean="0"/>
-              <a:t>02/02/2025</a:t>
+              <a:t>17/02/2025</a:t>
             </a:fld>
             <a:endParaRPr lang="fr-FR"/>
           </a:p>
@@ -23304,7 +23304,7 @@
           <a:p>
             <a:fld id="{DEAE869C-FD18-4CA6-B58E-F785B722D3DA}" type="datetimeFigureOut">
               <a:rPr lang="fr-FR" smtClean="0"/>
-              <a:t>02/02/2025</a:t>
+              <a:t>17/02/2025</a:t>
             </a:fld>
             <a:endParaRPr lang="fr-FR"/>
           </a:p>
@@ -23569,7 +23569,7 @@
           <a:p>
             <a:fld id="{DEAE869C-FD18-4CA6-B58E-F785B722D3DA}" type="datetimeFigureOut">
               <a:rPr lang="fr-FR" smtClean="0"/>
-              <a:t>02/02/2025</a:t>
+              <a:t>17/02/2025</a:t>
             </a:fld>
             <a:endParaRPr lang="fr-FR"/>
           </a:p>
@@ -23981,7 +23981,7 @@
           <a:p>
             <a:fld id="{DEAE869C-FD18-4CA6-B58E-F785B722D3DA}" type="datetimeFigureOut">
               <a:rPr lang="fr-FR" smtClean="0"/>
-              <a:t>02/02/2025</a:t>
+              <a:t>17/02/2025</a:t>
             </a:fld>
             <a:endParaRPr lang="fr-FR"/>
           </a:p>
@@ -24122,7 +24122,7 @@
           <a:p>
             <a:fld id="{DEAE869C-FD18-4CA6-B58E-F785B722D3DA}" type="datetimeFigureOut">
               <a:rPr lang="fr-FR" smtClean="0"/>
-              <a:t>02/02/2025</a:t>
+              <a:t>17/02/2025</a:t>
             </a:fld>
             <a:endParaRPr lang="fr-FR"/>
           </a:p>
@@ -24235,7 +24235,7 @@
           <a:p>
             <a:fld id="{DEAE869C-FD18-4CA6-B58E-F785B722D3DA}" type="datetimeFigureOut">
               <a:rPr lang="fr-FR" smtClean="0"/>
-              <a:t>02/02/2025</a:t>
+              <a:t>17/02/2025</a:t>
             </a:fld>
             <a:endParaRPr lang="fr-FR"/>
           </a:p>
@@ -24546,7 +24546,7 @@
           <a:p>
             <a:fld id="{DEAE869C-FD18-4CA6-B58E-F785B722D3DA}" type="datetimeFigureOut">
               <a:rPr lang="fr-FR" smtClean="0"/>
-              <a:t>02/02/2025</a:t>
+              <a:t>17/02/2025</a:t>
             </a:fld>
             <a:endParaRPr lang="fr-FR"/>
           </a:p>
@@ -24834,7 +24834,7 @@
           <a:p>
             <a:fld id="{DEAE869C-FD18-4CA6-B58E-F785B722D3DA}" type="datetimeFigureOut">
               <a:rPr lang="fr-FR" smtClean="0"/>
-              <a:t>02/02/2025</a:t>
+              <a:t>17/02/2025</a:t>
             </a:fld>
             <a:endParaRPr lang="fr-FR"/>
           </a:p>
@@ -25075,7 +25075,7 @@
           <a:p>
             <a:fld id="{DEAE869C-FD18-4CA6-B58E-F785B722D3DA}" type="datetimeFigureOut">
               <a:rPr lang="fr-FR" smtClean="0"/>
-              <a:t>02/02/2025</a:t>
+              <a:t>17/02/2025</a:t>
             </a:fld>
             <a:endParaRPr lang="fr-FR"/>
           </a:p>
@@ -25506,10 +25506,10 @@
         </p:nvGrpSpPr>
         <p:grpSpPr>
           <a:xfrm>
-            <a:off x="1927457" y="0"/>
-            <a:ext cx="8881632" cy="6881840"/>
-            <a:chOff x="1927457" y="0"/>
-            <a:chExt cx="8881632" cy="6881840"/>
+            <a:off x="1984540" y="462498"/>
+            <a:ext cx="8219449" cy="6419342"/>
+            <a:chOff x="1984540" y="462498"/>
+            <a:chExt cx="8219449" cy="6419342"/>
           </a:xfrm>
         </p:grpSpPr>
         <p:grpSp>
@@ -25526,10 +25526,10 @@
           </p:nvGrpSpPr>
           <p:grpSpPr>
             <a:xfrm>
-              <a:off x="1927457" y="0"/>
-              <a:ext cx="8881632" cy="6100993"/>
-              <a:chOff x="1927457" y="48442"/>
-              <a:chExt cx="8881632" cy="6100993"/>
+              <a:off x="1984540" y="462498"/>
+              <a:ext cx="8219449" cy="5638495"/>
+              <a:chOff x="1984540" y="510940"/>
+              <a:chExt cx="8219449" cy="5638495"/>
             </a:xfrm>
           </p:grpSpPr>
           <p:grpSp>
@@ -25546,10 +25546,10 @@
             </p:nvGrpSpPr>
             <p:grpSpPr>
               <a:xfrm>
-                <a:off x="1927457" y="48442"/>
-                <a:ext cx="8881632" cy="6100993"/>
-                <a:chOff x="1927457" y="48442"/>
-                <a:chExt cx="8881632" cy="6100993"/>
+                <a:off x="1984540" y="510940"/>
+                <a:ext cx="7780757" cy="5638495"/>
+                <a:chOff x="1984540" y="510940"/>
+                <a:chExt cx="7780757" cy="5638495"/>
               </a:xfrm>
             </p:grpSpPr>
             <p:grpSp>
@@ -25566,51 +25566,12 @@
               </p:nvGrpSpPr>
               <p:grpSpPr>
                 <a:xfrm>
-                  <a:off x="1984540" y="1920240"/>
-                  <a:ext cx="786763" cy="4219417"/>
-                  <a:chOff x="1984540" y="1361440"/>
-                  <a:chExt cx="786763" cy="4219417"/>
+                  <a:off x="1984540" y="3305068"/>
+                  <a:ext cx="786763" cy="2834589"/>
+                  <a:chOff x="1984540" y="2746268"/>
+                  <a:chExt cx="786763" cy="2834589"/>
                 </a:xfrm>
               </p:grpSpPr>
-              <p:cxnSp>
-                <p:nvCxnSpPr>
-                  <p:cNvPr id="74" name="Connecteur droit 73">
-                    <a:extLst>
-                      <a:ext uri="{FF2B5EF4-FFF2-40B4-BE49-F238E27FC236}">
-                        <a16:creationId xmlns:a16="http://schemas.microsoft.com/office/drawing/2014/main" id="{EEB95B78-FEBC-32CC-4A29-42ED0A605929}"/>
-                      </a:ext>
-                    </a:extLst>
-                  </p:cNvPr>
-                  <p:cNvCxnSpPr>
-                    <a:cxnSpLocks/>
-                  </p:cNvCxnSpPr>
-                  <p:nvPr/>
-                </p:nvCxnSpPr>
-                <p:spPr>
-                  <a:xfrm>
-                    <a:off x="2771303" y="1361440"/>
-                    <a:ext cx="0" cy="552335"/>
-                  </a:xfrm>
-                  <a:prstGeom prst="line">
-                    <a:avLst/>
-                  </a:prstGeom>
-                  <a:ln w="38100"/>
-                </p:spPr>
-                <p:style>
-                  <a:lnRef idx="2">
-                    <a:schemeClr val="accent1"/>
-                  </a:lnRef>
-                  <a:fillRef idx="0">
-                    <a:schemeClr val="accent1"/>
-                  </a:fillRef>
-                  <a:effectRef idx="1">
-                    <a:schemeClr val="accent1"/>
-                  </a:effectRef>
-                  <a:fontRef idx="minor">
-                    <a:schemeClr val="tx1"/>
-                  </a:fontRef>
-                </p:style>
-              </p:cxnSp>
               <p:cxnSp>
                 <p:nvCxnSpPr>
                   <p:cNvPr id="75" name="Connecteur droit 74">
@@ -25925,51 +25886,12 @@
               </p:nvGrpSpPr>
               <p:grpSpPr>
                 <a:xfrm>
-                  <a:off x="3858797" y="2016760"/>
-                  <a:ext cx="900356" cy="4132675"/>
-                  <a:chOff x="1870947" y="1457960"/>
-                  <a:chExt cx="900356" cy="4132675"/>
+                  <a:off x="3858797" y="3314846"/>
+                  <a:ext cx="900356" cy="2834589"/>
+                  <a:chOff x="1870947" y="2756046"/>
+                  <a:chExt cx="900356" cy="2834589"/>
                 </a:xfrm>
               </p:grpSpPr>
-              <p:cxnSp>
-                <p:nvCxnSpPr>
-                  <p:cNvPr id="87" name="Connecteur droit 86">
-                    <a:extLst>
-                      <a:ext uri="{FF2B5EF4-FFF2-40B4-BE49-F238E27FC236}">
-                        <a16:creationId xmlns:a16="http://schemas.microsoft.com/office/drawing/2014/main" id="{6FCACC9C-A211-2621-5F20-EC768ED40051}"/>
-                      </a:ext>
-                    </a:extLst>
-                  </p:cNvPr>
-                  <p:cNvCxnSpPr>
-                    <a:cxnSpLocks/>
-                  </p:cNvCxnSpPr>
-                  <p:nvPr/>
-                </p:nvCxnSpPr>
-                <p:spPr>
-                  <a:xfrm>
-                    <a:off x="2771303" y="1457960"/>
-                    <a:ext cx="0" cy="455815"/>
-                  </a:xfrm>
-                  <a:prstGeom prst="line">
-                    <a:avLst/>
-                  </a:prstGeom>
-                  <a:ln w="38100"/>
-                </p:spPr>
-                <p:style>
-                  <a:lnRef idx="2">
-                    <a:schemeClr val="accent1"/>
-                  </a:lnRef>
-                  <a:fillRef idx="0">
-                    <a:schemeClr val="accent1"/>
-                  </a:fillRef>
-                  <a:effectRef idx="1">
-                    <a:schemeClr val="accent1"/>
-                  </a:effectRef>
-                  <a:fontRef idx="minor">
-                    <a:schemeClr val="tx1"/>
-                  </a:fontRef>
-                </p:style>
-              </p:cxnSp>
               <p:cxnSp>
                 <p:nvCxnSpPr>
                   <p:cNvPr id="88" name="Connecteur droit 87">
@@ -26283,51 +26205,12 @@
               </p:nvGrpSpPr>
               <p:grpSpPr>
                 <a:xfrm>
-                  <a:off x="5853070" y="2016760"/>
-                  <a:ext cx="877731" cy="4122897"/>
-                  <a:chOff x="1893572" y="1457960"/>
-                  <a:chExt cx="877731" cy="4122897"/>
+                  <a:off x="5853070" y="3305068"/>
+                  <a:ext cx="877731" cy="2834589"/>
+                  <a:chOff x="1893572" y="2746268"/>
+                  <a:chExt cx="877731" cy="2834589"/>
                 </a:xfrm>
               </p:grpSpPr>
-              <p:cxnSp>
-                <p:nvCxnSpPr>
-                  <p:cNvPr id="97" name="Connecteur droit 96">
-                    <a:extLst>
-                      <a:ext uri="{FF2B5EF4-FFF2-40B4-BE49-F238E27FC236}">
-                        <a16:creationId xmlns:a16="http://schemas.microsoft.com/office/drawing/2014/main" id="{150FC260-814D-272A-28E1-AC436505315F}"/>
-                      </a:ext>
-                    </a:extLst>
-                  </p:cNvPr>
-                  <p:cNvCxnSpPr>
-                    <a:cxnSpLocks/>
-                  </p:cNvCxnSpPr>
-                  <p:nvPr/>
-                </p:nvCxnSpPr>
-                <p:spPr>
-                  <a:xfrm>
-                    <a:off x="2771303" y="1457960"/>
-                    <a:ext cx="0" cy="455815"/>
-                  </a:xfrm>
-                  <a:prstGeom prst="line">
-                    <a:avLst/>
-                  </a:prstGeom>
-                  <a:ln w="38100"/>
-                </p:spPr>
-                <p:style>
-                  <a:lnRef idx="2">
-                    <a:schemeClr val="accent1"/>
-                  </a:lnRef>
-                  <a:fillRef idx="0">
-                    <a:schemeClr val="accent1"/>
-                  </a:fillRef>
-                  <a:effectRef idx="1">
-                    <a:schemeClr val="accent1"/>
-                  </a:effectRef>
-                  <a:fontRef idx="minor">
-                    <a:schemeClr val="tx1"/>
-                  </a:fontRef>
-                </p:style>
-              </p:cxnSp>
               <p:cxnSp>
                 <p:nvCxnSpPr>
                   <p:cNvPr id="98" name="Connecteur droit 97">
@@ -26462,49 +26345,12 @@
               </p:nvGrpSpPr>
               <p:grpSpPr>
                 <a:xfrm>
-                  <a:off x="6868346" y="892695"/>
-                  <a:ext cx="877761" cy="5246962"/>
-                  <a:chOff x="1893542" y="333895"/>
-                  <a:chExt cx="877761" cy="5246962"/>
+                  <a:off x="6868346" y="3305068"/>
+                  <a:ext cx="877761" cy="2834589"/>
+                  <a:chOff x="1893542" y="2746268"/>
+                  <a:chExt cx="877761" cy="2834589"/>
                 </a:xfrm>
               </p:grpSpPr>
-              <p:cxnSp>
-                <p:nvCxnSpPr>
-                  <p:cNvPr id="102" name="Connecteur droit 101">
-                    <a:extLst>
-                      <a:ext uri="{FF2B5EF4-FFF2-40B4-BE49-F238E27FC236}">
-                        <a16:creationId xmlns:a16="http://schemas.microsoft.com/office/drawing/2014/main" id="{67BE1120-7133-4AF1-C3A2-65F1316B87F0}"/>
-                      </a:ext>
-                    </a:extLst>
-                  </p:cNvPr>
-                  <p:cNvCxnSpPr/>
-                  <p:nvPr/>
-                </p:nvCxnSpPr>
-                <p:spPr>
-                  <a:xfrm>
-                    <a:off x="2771303" y="333895"/>
-                    <a:ext cx="0" cy="1579880"/>
-                  </a:xfrm>
-                  <a:prstGeom prst="line">
-                    <a:avLst/>
-                  </a:prstGeom>
-                  <a:ln w="38100"/>
-                </p:spPr>
-                <p:style>
-                  <a:lnRef idx="2">
-                    <a:schemeClr val="accent1"/>
-                  </a:lnRef>
-                  <a:fillRef idx="0">
-                    <a:schemeClr val="accent1"/>
-                  </a:fillRef>
-                  <a:effectRef idx="1">
-                    <a:schemeClr val="accent1"/>
-                  </a:effectRef>
-                  <a:fontRef idx="minor">
-                    <a:schemeClr val="tx1"/>
-                  </a:fontRef>
-                </p:style>
-              </p:cxnSp>
               <p:cxnSp>
                 <p:nvCxnSpPr>
                   <p:cNvPr id="103" name="Connecteur droit 102">
@@ -26639,51 +26485,12 @@
               </p:nvGrpSpPr>
               <p:grpSpPr>
                 <a:xfrm>
-                  <a:off x="7868062" y="1920240"/>
-                  <a:ext cx="913621" cy="4219417"/>
-                  <a:chOff x="1857682" y="1361440"/>
-                  <a:chExt cx="913621" cy="4219417"/>
+                  <a:off x="7868062" y="3305068"/>
+                  <a:ext cx="913621" cy="2834589"/>
+                  <a:chOff x="1857682" y="2746268"/>
+                  <a:chExt cx="913621" cy="2834589"/>
                 </a:xfrm>
               </p:grpSpPr>
-              <p:cxnSp>
-                <p:nvCxnSpPr>
-                  <p:cNvPr id="107" name="Connecteur droit 106">
-                    <a:extLst>
-                      <a:ext uri="{FF2B5EF4-FFF2-40B4-BE49-F238E27FC236}">
-                        <a16:creationId xmlns:a16="http://schemas.microsoft.com/office/drawing/2014/main" id="{79661A1B-8C44-19A4-D636-F4E35F553453}"/>
-                      </a:ext>
-                    </a:extLst>
-                  </p:cNvPr>
-                  <p:cNvCxnSpPr>
-                    <a:cxnSpLocks/>
-                  </p:cNvCxnSpPr>
-                  <p:nvPr/>
-                </p:nvCxnSpPr>
-                <p:spPr>
-                  <a:xfrm>
-                    <a:off x="2771303" y="1361440"/>
-                    <a:ext cx="0" cy="552335"/>
-                  </a:xfrm>
-                  <a:prstGeom prst="line">
-                    <a:avLst/>
-                  </a:prstGeom>
-                  <a:ln w="38100"/>
-                </p:spPr>
-                <p:style>
-                  <a:lnRef idx="2">
-                    <a:schemeClr val="accent1"/>
-                  </a:lnRef>
-                  <a:fillRef idx="0">
-                    <a:schemeClr val="accent1"/>
-                  </a:fillRef>
-                  <a:effectRef idx="1">
-                    <a:schemeClr val="accent1"/>
-                  </a:effectRef>
-                  <a:fontRef idx="minor">
-                    <a:schemeClr val="tx1"/>
-                  </a:fontRef>
-                </p:style>
-              </p:cxnSp>
               <p:cxnSp>
                 <p:nvCxnSpPr>
                   <p:cNvPr id="108" name="Connecteur droit 107">
@@ -26818,49 +26625,12 @@
               </p:nvGrpSpPr>
               <p:grpSpPr>
                 <a:xfrm>
-                  <a:off x="8854434" y="892695"/>
-                  <a:ext cx="910863" cy="5246962"/>
-                  <a:chOff x="1860440" y="333895"/>
-                  <a:chExt cx="910863" cy="5246962"/>
+                  <a:off x="8854434" y="3305068"/>
+                  <a:ext cx="910863" cy="2834589"/>
+                  <a:chOff x="1860440" y="2746268"/>
+                  <a:chExt cx="910863" cy="2834589"/>
                 </a:xfrm>
               </p:grpSpPr>
-              <p:cxnSp>
-                <p:nvCxnSpPr>
-                  <p:cNvPr id="112" name="Connecteur droit 111">
-                    <a:extLst>
-                      <a:ext uri="{FF2B5EF4-FFF2-40B4-BE49-F238E27FC236}">
-                        <a16:creationId xmlns:a16="http://schemas.microsoft.com/office/drawing/2014/main" id="{D565827B-0F7A-8F19-387E-965F2242D151}"/>
-                      </a:ext>
-                    </a:extLst>
-                  </p:cNvPr>
-                  <p:cNvCxnSpPr/>
-                  <p:nvPr/>
-                </p:nvCxnSpPr>
-                <p:spPr>
-                  <a:xfrm>
-                    <a:off x="2771303" y="333895"/>
-                    <a:ext cx="0" cy="1579880"/>
-                  </a:xfrm>
-                  <a:prstGeom prst="line">
-                    <a:avLst/>
-                  </a:prstGeom>
-                  <a:ln w="38100"/>
-                </p:spPr>
-                <p:style>
-                  <a:lnRef idx="2">
-                    <a:schemeClr val="accent1"/>
-                  </a:lnRef>
-                  <a:fillRef idx="0">
-                    <a:schemeClr val="accent1"/>
-                  </a:fillRef>
-                  <a:effectRef idx="1">
-                    <a:schemeClr val="accent1"/>
-                  </a:effectRef>
-                  <a:fontRef idx="minor">
-                    <a:schemeClr val="tx1"/>
-                  </a:fontRef>
-                </p:style>
-              </p:cxnSp>
               <p:cxnSp>
                 <p:nvCxnSpPr>
                   <p:cNvPr id="113" name="Connecteur droit 112">
@@ -26983,46 +26753,6 @@
             </p:grpSp>
             <p:sp>
               <p:nvSpPr>
-                <p:cNvPr id="117" name="ZoneTexte 116">
-                  <a:extLst>
-                    <a:ext uri="{FF2B5EF4-FFF2-40B4-BE49-F238E27FC236}">
-                      <a16:creationId xmlns:a16="http://schemas.microsoft.com/office/drawing/2014/main" id="{B97F1FB5-BD37-C353-7C16-392F0A3F3E54}"/>
-                    </a:ext>
-                  </a:extLst>
-                </p:cNvPr>
-                <p:cNvSpPr txBox="1"/>
-                <p:nvPr/>
-              </p:nvSpPr>
-              <p:spPr>
-                <a:xfrm>
-                  <a:off x="1927457" y="1292402"/>
-                  <a:ext cx="1747806" cy="646331"/>
-                </a:xfrm>
-                <a:prstGeom prst="rect">
-                  <a:avLst/>
-                </a:prstGeom>
-                <a:noFill/>
-              </p:spPr>
-              <p:txBody>
-                <a:bodyPr vert="horz" wrap="square" rtlCol="0" anchor="ctr">
-                  <a:spAutoFit/>
-                </a:bodyPr>
-                <a:lstStyle/>
-                <a:p>
-                  <a:pPr algn="ctr"/>
-                  <a:r>
-                    <a:rPr lang="fr-FR" dirty="0">
-                      <a:solidFill>
-                        <a:schemeClr val="accent1"/>
-                      </a:solidFill>
-                    </a:rPr>
-                    <a:t>Revue de Mission</a:t>
-                  </a:r>
-                </a:p>
-              </p:txBody>
-            </p:sp>
-            <p:sp>
-              <p:nvSpPr>
                 <p:cNvPr id="121" name="ZoneTexte 120">
                   <a:extLst>
                     <a:ext uri="{FF2B5EF4-FFF2-40B4-BE49-F238E27FC236}">
@@ -27063,10 +26793,10 @@
             </p:sp>
             <p:sp>
               <p:nvSpPr>
-                <p:cNvPr id="122" name="ZoneTexte 121">
+                <p:cNvPr id="3" name="ZoneTexte 2">
                   <a:extLst>
                     <a:ext uri="{FF2B5EF4-FFF2-40B4-BE49-F238E27FC236}">
-                      <a16:creationId xmlns:a16="http://schemas.microsoft.com/office/drawing/2014/main" id="{71BC06F5-32D4-2237-D2F2-F2EF4FC98D25}"/>
+                      <a16:creationId xmlns:a16="http://schemas.microsoft.com/office/drawing/2014/main" id="{0CB5ACA2-7308-A05B-88A9-BFBCD2ED6167}"/>
                     </a:ext>
                   </a:extLst>
                 </p:cNvPr>
@@ -27075,8 +26805,8 @@
               </p:nvSpPr>
               <p:spPr>
                 <a:xfrm>
-                  <a:off x="4033066" y="1126066"/>
-                  <a:ext cx="1476896" cy="923330"/>
+                  <a:off x="4943848" y="510940"/>
+                  <a:ext cx="1747806" cy="646331"/>
                 </a:xfrm>
                 <a:prstGeom prst="rect">
                   <a:avLst/>
@@ -27096,237 +26826,7 @@
                         <a:schemeClr val="accent1"/>
                       </a:solidFill>
                     </a:rPr>
-                    <a:t>Revue de Conception Préliminaire</a:t>
-                  </a:r>
-                </a:p>
-              </p:txBody>
-            </p:sp>
-            <p:sp>
-              <p:nvSpPr>
-                <p:cNvPr id="128" name="ZoneTexte 127">
-                  <a:extLst>
-                    <a:ext uri="{FF2B5EF4-FFF2-40B4-BE49-F238E27FC236}">
-                      <a16:creationId xmlns:a16="http://schemas.microsoft.com/office/drawing/2014/main" id="{08D955F5-C0BD-9465-E65B-D00074AFFC83}"/>
-                    </a:ext>
-                  </a:extLst>
-                </p:cNvPr>
-                <p:cNvSpPr txBox="1"/>
-                <p:nvPr/>
-              </p:nvSpPr>
-              <p:spPr>
-                <a:xfrm>
-                  <a:off x="4848277" y="48442"/>
-                  <a:ext cx="1938096" cy="1200329"/>
-                </a:xfrm>
-                <a:prstGeom prst="rect">
-                  <a:avLst/>
-                </a:prstGeom>
-                <a:noFill/>
-              </p:spPr>
-              <p:txBody>
-                <a:bodyPr vert="horz" wrap="square" rtlCol="0" anchor="ctr">
-                  <a:spAutoFit/>
-                </a:bodyPr>
-                <a:lstStyle/>
-                <a:p>
-                  <a:pPr algn="ctr"/>
-                  <a:r>
-                    <a:rPr lang="fr-FR" dirty="0">
-                      <a:solidFill>
-                        <a:schemeClr val="accent1"/>
-                      </a:solidFill>
-                    </a:rPr>
-                    <a:t>Revue de Conception Détaillée + Revue de Qualification</a:t>
-                  </a:r>
-                </a:p>
-              </p:txBody>
-            </p:sp>
-            <p:sp>
-              <p:nvSpPr>
-                <p:cNvPr id="130" name="ZoneTexte 129">
-                  <a:extLst>
-                    <a:ext uri="{FF2B5EF4-FFF2-40B4-BE49-F238E27FC236}">
-                      <a16:creationId xmlns:a16="http://schemas.microsoft.com/office/drawing/2014/main" id="{704D1DCD-77D9-826B-6D6F-28B8C7EE7F84}"/>
-                    </a:ext>
-                  </a:extLst>
-                </p:cNvPr>
-                <p:cNvSpPr txBox="1"/>
-                <p:nvPr/>
-              </p:nvSpPr>
-              <p:spPr>
-                <a:xfrm>
-                  <a:off x="5829005" y="1372245"/>
-                  <a:ext cx="1814680" cy="646331"/>
-                </a:xfrm>
-                <a:prstGeom prst="rect">
-                  <a:avLst/>
-                </a:prstGeom>
-                <a:noFill/>
-              </p:spPr>
-              <p:txBody>
-                <a:bodyPr vert="horz" wrap="square" rtlCol="0" anchor="ctr">
-                  <a:spAutoFit/>
-                </a:bodyPr>
-                <a:lstStyle/>
-                <a:p>
-                  <a:pPr algn="ctr"/>
-                  <a:r>
-                    <a:rPr lang="fr-FR" dirty="0">
-                      <a:solidFill>
-                        <a:schemeClr val="accent1"/>
-                      </a:solidFill>
-                    </a:rPr>
-                    <a:t>Revue d’Acceptation</a:t>
-                  </a:r>
-                </a:p>
-              </p:txBody>
-            </p:sp>
-            <p:sp>
-              <p:nvSpPr>
-                <p:cNvPr id="131" name="ZoneTexte 130">
-                  <a:extLst>
-                    <a:ext uri="{FF2B5EF4-FFF2-40B4-BE49-F238E27FC236}">
-                      <a16:creationId xmlns:a16="http://schemas.microsoft.com/office/drawing/2014/main" id="{CDEEF491-43C6-2231-91B3-6CE952D26E18}"/>
-                    </a:ext>
-                  </a:extLst>
-                </p:cNvPr>
-                <p:cNvSpPr txBox="1"/>
-                <p:nvPr/>
-              </p:nvSpPr>
-              <p:spPr>
-                <a:xfrm>
-                  <a:off x="6838767" y="165209"/>
-                  <a:ext cx="1814680" cy="646331"/>
-                </a:xfrm>
-                <a:prstGeom prst="rect">
-                  <a:avLst/>
-                </a:prstGeom>
-                <a:noFill/>
-              </p:spPr>
-              <p:txBody>
-                <a:bodyPr vert="horz" wrap="square" rtlCol="0" anchor="ctr">
-                  <a:spAutoFit/>
-                </a:bodyPr>
-                <a:lstStyle/>
-                <a:p>
-                  <a:pPr algn="ctr"/>
-                  <a:r>
-                    <a:rPr lang="fr-FR" dirty="0">
-                      <a:solidFill>
-                        <a:schemeClr val="accent1"/>
-                      </a:solidFill>
-                    </a:rPr>
-                    <a:t>Revue de Maintenabilité</a:t>
-                  </a:r>
-                </a:p>
-              </p:txBody>
-            </p:sp>
-            <p:sp>
-              <p:nvSpPr>
-                <p:cNvPr id="133" name="ZoneTexte 132">
-                  <a:extLst>
-                    <a:ext uri="{FF2B5EF4-FFF2-40B4-BE49-F238E27FC236}">
-                      <a16:creationId xmlns:a16="http://schemas.microsoft.com/office/drawing/2014/main" id="{5CED011B-9008-8E0F-8B9B-060E0B834F1F}"/>
-                    </a:ext>
-                  </a:extLst>
-                </p:cNvPr>
-                <p:cNvSpPr txBox="1"/>
-                <p:nvPr/>
-              </p:nvSpPr>
-              <p:spPr>
-                <a:xfrm>
-                  <a:off x="7737891" y="1222732"/>
-                  <a:ext cx="2087584" cy="646331"/>
-                </a:xfrm>
-                <a:prstGeom prst="rect">
-                  <a:avLst/>
-                </a:prstGeom>
-                <a:noFill/>
-              </p:spPr>
-              <p:txBody>
-                <a:bodyPr vert="horz" wrap="square" rtlCol="0" anchor="ctr">
-                  <a:spAutoFit/>
-                </a:bodyPr>
-                <a:lstStyle/>
-                <a:p>
-                  <a:pPr algn="ctr"/>
-                  <a:r>
-                    <a:rPr lang="fr-FR" dirty="0">
-                      <a:solidFill>
-                        <a:schemeClr val="accent1"/>
-                      </a:solidFill>
-                    </a:rPr>
-                    <a:t>Revue </a:t>
-                  </a:r>
-                  <a:br>
-                    <a:rPr lang="fr-FR" dirty="0">
-                      <a:solidFill>
-                        <a:schemeClr val="accent1"/>
-                      </a:solidFill>
-                    </a:rPr>
-                  </a:br>
-                  <a:r>
-                    <a:rPr lang="fr-FR" dirty="0">
-                      <a:solidFill>
-                        <a:schemeClr val="accent1"/>
-                      </a:solidFill>
-                    </a:rPr>
-                    <a:t>d’Éco-conception</a:t>
-                  </a:r>
-                </a:p>
-              </p:txBody>
-            </p:sp>
-            <p:sp>
-              <p:nvSpPr>
-                <p:cNvPr id="134" name="ZoneTexte 133">
-                  <a:extLst>
-                    <a:ext uri="{FF2B5EF4-FFF2-40B4-BE49-F238E27FC236}">
-                      <a16:creationId xmlns:a16="http://schemas.microsoft.com/office/drawing/2014/main" id="{E4AD3564-1E6B-C052-5525-24A540252D36}"/>
-                    </a:ext>
-                  </a:extLst>
-                </p:cNvPr>
-                <p:cNvSpPr txBox="1"/>
-                <p:nvPr/>
-              </p:nvSpPr>
-              <p:spPr>
-                <a:xfrm>
-                  <a:off x="8721505" y="197595"/>
-                  <a:ext cx="2087584" cy="646331"/>
-                </a:xfrm>
-                <a:prstGeom prst="rect">
-                  <a:avLst/>
-                </a:prstGeom>
-                <a:noFill/>
-              </p:spPr>
-              <p:txBody>
-                <a:bodyPr vert="horz" wrap="square" rtlCol="0" anchor="ctr">
-                  <a:spAutoFit/>
-                </a:bodyPr>
-                <a:lstStyle/>
-                <a:p>
-                  <a:pPr algn="ctr"/>
-                  <a:r>
-                    <a:rPr lang="fr-FR" dirty="0">
-                      <a:solidFill>
-                        <a:schemeClr val="accent1"/>
-                      </a:solidFill>
-                    </a:rPr>
-                    <a:t>Revue </a:t>
-                  </a:r>
-                  <a:br>
-                    <a:rPr lang="fr-FR" dirty="0">
-                      <a:solidFill>
-                        <a:schemeClr val="accent1"/>
-                      </a:solidFill>
-                    </a:rPr>
-                  </a:br>
-                  <a:r>
-                    <a:rPr lang="fr-FR" dirty="0">
-                      <a:solidFill>
-                        <a:schemeClr val="accent1"/>
-                      </a:solidFill>
-                    </a:rPr>
-                    <a:t>d’Expérience</a:t>
+                    <a:t>Revue d’acceptation</a:t>
                   </a:r>
                 </a:p>
               </p:txBody>

</xml_diff>

<commit_message>
Avancée de la revue
Partie 01 et 02 finie, plus que 03,04,05 et 06
</commit_message>
<xml_diff>
--- a/Gestion de Projet/Phase 0/Diagrammes phase 0.pptx
+++ b/Gestion de Projet/Phase 0/Diagrammes phase 0.pptx
@@ -21927,7 +21927,7 @@
           <a:p>
             <a:fld id="{A20A18A5-0E0E-4059-9C3A-AEC3E78DECBE}" type="datetimeFigureOut">
               <a:rPr lang="fr-FR" smtClean="0"/>
-              <a:t>17/02/2025</a:t>
+              <a:t>01/03/2025</a:t>
             </a:fld>
             <a:endParaRPr lang="fr-FR"/>
           </a:p>
@@ -22425,7 +22425,7 @@
           <a:p>
             <a:fld id="{DEAE869C-FD18-4CA6-B58E-F785B722D3DA}" type="datetimeFigureOut">
               <a:rPr lang="fr-FR" smtClean="0"/>
-              <a:t>17/02/2025</a:t>
+              <a:t>01/03/2025</a:t>
             </a:fld>
             <a:endParaRPr lang="fr-FR"/>
           </a:p>
@@ -22623,7 +22623,7 @@
           <a:p>
             <a:fld id="{DEAE869C-FD18-4CA6-B58E-F785B722D3DA}" type="datetimeFigureOut">
               <a:rPr lang="fr-FR" smtClean="0"/>
-              <a:t>17/02/2025</a:t>
+              <a:t>01/03/2025</a:t>
             </a:fld>
             <a:endParaRPr lang="fr-FR"/>
           </a:p>
@@ -22831,7 +22831,7 @@
           <a:p>
             <a:fld id="{DEAE869C-FD18-4CA6-B58E-F785B722D3DA}" type="datetimeFigureOut">
               <a:rPr lang="fr-FR" smtClean="0"/>
-              <a:t>17/02/2025</a:t>
+              <a:t>01/03/2025</a:t>
             </a:fld>
             <a:endParaRPr lang="fr-FR"/>
           </a:p>
@@ -23029,7 +23029,7 @@
           <a:p>
             <a:fld id="{DEAE869C-FD18-4CA6-B58E-F785B722D3DA}" type="datetimeFigureOut">
               <a:rPr lang="fr-FR" smtClean="0"/>
-              <a:t>17/02/2025</a:t>
+              <a:t>01/03/2025</a:t>
             </a:fld>
             <a:endParaRPr lang="fr-FR"/>
           </a:p>
@@ -23304,7 +23304,7 @@
           <a:p>
             <a:fld id="{DEAE869C-FD18-4CA6-B58E-F785B722D3DA}" type="datetimeFigureOut">
               <a:rPr lang="fr-FR" smtClean="0"/>
-              <a:t>17/02/2025</a:t>
+              <a:t>01/03/2025</a:t>
             </a:fld>
             <a:endParaRPr lang="fr-FR"/>
           </a:p>
@@ -23569,7 +23569,7 @@
           <a:p>
             <a:fld id="{DEAE869C-FD18-4CA6-B58E-F785B722D3DA}" type="datetimeFigureOut">
               <a:rPr lang="fr-FR" smtClean="0"/>
-              <a:t>17/02/2025</a:t>
+              <a:t>01/03/2025</a:t>
             </a:fld>
             <a:endParaRPr lang="fr-FR"/>
           </a:p>
@@ -23981,7 +23981,7 @@
           <a:p>
             <a:fld id="{DEAE869C-FD18-4CA6-B58E-F785B722D3DA}" type="datetimeFigureOut">
               <a:rPr lang="fr-FR" smtClean="0"/>
-              <a:t>17/02/2025</a:t>
+              <a:t>01/03/2025</a:t>
             </a:fld>
             <a:endParaRPr lang="fr-FR"/>
           </a:p>
@@ -24122,7 +24122,7 @@
           <a:p>
             <a:fld id="{DEAE869C-FD18-4CA6-B58E-F785B722D3DA}" type="datetimeFigureOut">
               <a:rPr lang="fr-FR" smtClean="0"/>
-              <a:t>17/02/2025</a:t>
+              <a:t>01/03/2025</a:t>
             </a:fld>
             <a:endParaRPr lang="fr-FR"/>
           </a:p>
@@ -24235,7 +24235,7 @@
           <a:p>
             <a:fld id="{DEAE869C-FD18-4CA6-B58E-F785B722D3DA}" type="datetimeFigureOut">
               <a:rPr lang="fr-FR" smtClean="0"/>
-              <a:t>17/02/2025</a:t>
+              <a:t>01/03/2025</a:t>
             </a:fld>
             <a:endParaRPr lang="fr-FR"/>
           </a:p>
@@ -24546,7 +24546,7 @@
           <a:p>
             <a:fld id="{DEAE869C-FD18-4CA6-B58E-F785B722D3DA}" type="datetimeFigureOut">
               <a:rPr lang="fr-FR" smtClean="0"/>
-              <a:t>17/02/2025</a:t>
+              <a:t>01/03/2025</a:t>
             </a:fld>
             <a:endParaRPr lang="fr-FR"/>
           </a:p>
@@ -24834,7 +24834,7 @@
           <a:p>
             <a:fld id="{DEAE869C-FD18-4CA6-B58E-F785B722D3DA}" type="datetimeFigureOut">
               <a:rPr lang="fr-FR" smtClean="0"/>
-              <a:t>17/02/2025</a:t>
+              <a:t>01/03/2025</a:t>
             </a:fld>
             <a:endParaRPr lang="fr-FR"/>
           </a:p>
@@ -25075,7 +25075,7 @@
           <a:p>
             <a:fld id="{DEAE869C-FD18-4CA6-B58E-F785B722D3DA}" type="datetimeFigureOut">
               <a:rPr lang="fr-FR" smtClean="0"/>
-              <a:t>17/02/2025</a:t>
+              <a:t>01/03/2025</a:t>
             </a:fld>
             <a:endParaRPr lang="fr-FR"/>
           </a:p>

</xml_diff>